<commit_message>
change slides with updated material
</commit_message>
<xml_diff>
--- a/3 - GAN Evaluations/3 - GAN Evaluation Methods.pptx
+++ b/3 - GAN Evaluations/3 - GAN Evaluation Methods.pptx
@@ -211,7 +211,7 @@
           <a:p>
             <a:fld id="{87E75B63-7E26-D441-AC03-A4A443673F7F}" type="datetimeFigureOut">
               <a:rPr lang="en-US" smtClean="0"/>
-              <a:t>11/22/2019</a:t>
+              <a:t>11/20/19</a:t>
             </a:fld>
             <a:endParaRPr lang="en-US" dirty="0"/>
           </a:p>
@@ -709,7 +709,7 @@
           <a:p>
             <a:fld id="{6ED27D06-0092-5E4F-B259-C6383C920FFC}" type="datetimeFigureOut">
               <a:rPr lang="en-US" smtClean="0"/>
-              <a:t>11/22/2019</a:t>
+              <a:t>11/20/19</a:t>
             </a:fld>
             <a:endParaRPr lang="en-US" dirty="0"/>
           </a:p>
@@ -907,7 +907,7 @@
           <a:p>
             <a:fld id="{6ED27D06-0092-5E4F-B259-C6383C920FFC}" type="datetimeFigureOut">
               <a:rPr lang="en-US" smtClean="0"/>
-              <a:t>11/22/2019</a:t>
+              <a:t>11/20/19</a:t>
             </a:fld>
             <a:endParaRPr lang="en-US" dirty="0"/>
           </a:p>
@@ -1115,7 +1115,7 @@
           <a:p>
             <a:fld id="{6ED27D06-0092-5E4F-B259-C6383C920FFC}" type="datetimeFigureOut">
               <a:rPr lang="en-US" smtClean="0"/>
-              <a:t>11/22/2019</a:t>
+              <a:t>11/20/19</a:t>
             </a:fld>
             <a:endParaRPr lang="en-US" dirty="0"/>
           </a:p>
@@ -1313,7 +1313,7 @@
           <a:p>
             <a:fld id="{6ED27D06-0092-5E4F-B259-C6383C920FFC}" type="datetimeFigureOut">
               <a:rPr lang="en-US" smtClean="0"/>
-              <a:t>11/22/2019</a:t>
+              <a:t>11/20/19</a:t>
             </a:fld>
             <a:endParaRPr lang="en-US" dirty="0"/>
           </a:p>
@@ -1588,7 +1588,7 @@
           <a:p>
             <a:fld id="{6ED27D06-0092-5E4F-B259-C6383C920FFC}" type="datetimeFigureOut">
               <a:rPr lang="en-US" smtClean="0"/>
-              <a:t>11/22/2019</a:t>
+              <a:t>11/20/19</a:t>
             </a:fld>
             <a:endParaRPr lang="en-US" dirty="0"/>
           </a:p>
@@ -1853,7 +1853,7 @@
           <a:p>
             <a:fld id="{6ED27D06-0092-5E4F-B259-C6383C920FFC}" type="datetimeFigureOut">
               <a:rPr lang="en-US" smtClean="0"/>
-              <a:t>11/22/2019</a:t>
+              <a:t>11/20/19</a:t>
             </a:fld>
             <a:endParaRPr lang="en-US" dirty="0"/>
           </a:p>
@@ -2265,7 +2265,7 @@
           <a:p>
             <a:fld id="{6ED27D06-0092-5E4F-B259-C6383C920FFC}" type="datetimeFigureOut">
               <a:rPr lang="en-US" smtClean="0"/>
-              <a:t>11/22/2019</a:t>
+              <a:t>11/20/19</a:t>
             </a:fld>
             <a:endParaRPr lang="en-US" dirty="0"/>
           </a:p>
@@ -2406,7 +2406,7 @@
           <a:p>
             <a:fld id="{6ED27D06-0092-5E4F-B259-C6383C920FFC}" type="datetimeFigureOut">
               <a:rPr lang="en-US" smtClean="0"/>
-              <a:t>11/22/2019</a:t>
+              <a:t>11/20/19</a:t>
             </a:fld>
             <a:endParaRPr lang="en-US" dirty="0"/>
           </a:p>
@@ -2519,7 +2519,7 @@
           <a:p>
             <a:fld id="{6ED27D06-0092-5E4F-B259-C6383C920FFC}" type="datetimeFigureOut">
               <a:rPr lang="en-US" smtClean="0"/>
-              <a:t>11/22/2019</a:t>
+              <a:t>11/20/19</a:t>
             </a:fld>
             <a:endParaRPr lang="en-US" dirty="0"/>
           </a:p>
@@ -2830,7 +2830,7 @@
           <a:p>
             <a:fld id="{6ED27D06-0092-5E4F-B259-C6383C920FFC}" type="datetimeFigureOut">
               <a:rPr lang="en-US" smtClean="0"/>
-              <a:t>11/22/2019</a:t>
+              <a:t>11/20/19</a:t>
             </a:fld>
             <a:endParaRPr lang="en-US" dirty="0"/>
           </a:p>
@@ -3118,7 +3118,7 @@
           <a:p>
             <a:fld id="{6ED27D06-0092-5E4F-B259-C6383C920FFC}" type="datetimeFigureOut">
               <a:rPr lang="en-US" smtClean="0"/>
-              <a:t>11/22/2019</a:t>
+              <a:t>11/20/19</a:t>
             </a:fld>
             <a:endParaRPr lang="en-US" dirty="0"/>
           </a:p>
@@ -3359,7 +3359,7 @@
           <a:p>
             <a:fld id="{6ED27D06-0092-5E4F-B259-C6383C920FFC}" type="datetimeFigureOut">
               <a:rPr lang="en-US" smtClean="0"/>
-              <a:t>11/22/2019</a:t>
+              <a:t>11/20/19</a:t>
             </a:fld>
             <a:endParaRPr lang="en-US" dirty="0"/>
           </a:p>
@@ -3941,8 +3941,8 @@
           </a:p>
         </p:txBody>
       </p:sp>
-      <mc:AlternateContent xmlns:mc="http://schemas.openxmlformats.org/markup-compatibility/2006" xmlns:a14="http://schemas.microsoft.com/office/drawing/2010/main">
-        <mc:Choice Requires="a14">
+      <mc:AlternateContent xmlns:mc="http://schemas.openxmlformats.org/markup-compatibility/2006">
+        <mc:Choice xmlns:a14="http://schemas.microsoft.com/office/drawing/2010/main" Requires="a14">
           <p:sp>
             <p:nvSpPr>
               <p:cNvPr id="3" name="Content Placeholder 2">
@@ -4429,7 +4429,7 @@
             </p:txBody>
           </p:sp>
         </mc:Choice>
-        <mc:Fallback xmlns="">
+        <mc:Fallback>
           <p:sp>
             <p:nvSpPr>
               <p:cNvPr id="3" name="Content Placeholder 2">
@@ -4784,8 +4784,8 @@
           </a:p>
         </p:txBody>
       </p:sp>
-      <mc:AlternateContent xmlns:mc="http://schemas.openxmlformats.org/markup-compatibility/2006" xmlns:a14="http://schemas.microsoft.com/office/drawing/2010/main">
-        <mc:Choice Requires="a14">
+      <mc:AlternateContent xmlns:mc="http://schemas.openxmlformats.org/markup-compatibility/2006">
+        <mc:Choice xmlns:a14="http://schemas.microsoft.com/office/drawing/2010/main" Requires="a14">
           <p:sp>
             <p:nvSpPr>
               <p:cNvPr id="3" name="Content Placeholder 2">
@@ -4992,7 +4992,7 @@
             </p:txBody>
           </p:sp>
         </mc:Choice>
-        <mc:Fallback xmlns="">
+        <mc:Fallback>
           <p:sp>
             <p:nvSpPr>
               <p:cNvPr id="3" name="Content Placeholder 2">
@@ -5604,7 +5604,13 @@
               <a:rPr lang="en-ID" sz="2000" dirty="0">
                 <a:hlinkClick r:id="rId6"/>
               </a:rPr>
-              <a:t> Arxiv 2018</a:t>
+              <a:t> </a:t>
+            </a:r>
+            <a:r>
+              <a:rPr lang="en-ID" sz="2000" dirty="0">
+                <a:hlinkClick r:id="rId6"/>
+              </a:rPr>
+              <a:t>Arxiv 2018</a:t>
             </a:r>
             <a:endParaRPr lang="en-ID" sz="2000" dirty="0"/>
           </a:p>
@@ -7353,8 +7359,8 @@
           </a:p>
         </p:txBody>
       </p:sp>
-      <mc:AlternateContent xmlns:mc="http://schemas.openxmlformats.org/markup-compatibility/2006" xmlns:a14="http://schemas.microsoft.com/office/drawing/2010/main">
-        <mc:Choice Requires="a14">
+      <mc:AlternateContent xmlns:mc="http://schemas.openxmlformats.org/markup-compatibility/2006">
+        <mc:Choice xmlns:a14="http://schemas.microsoft.com/office/drawing/2010/main" Requires="a14">
           <p:sp>
             <p:nvSpPr>
               <p:cNvPr id="3" name="Content Placeholder 2">
@@ -7655,7 +7661,7 @@
             </p:txBody>
           </p:sp>
         </mc:Choice>
-        <mc:Fallback xmlns="">
+        <mc:Fallback>
           <p:sp>
             <p:nvSpPr>
               <p:cNvPr id="3" name="Content Placeholder 2">
@@ -7783,8 +7789,8 @@
           </a:p>
         </p:txBody>
       </p:sp>
-      <mc:AlternateContent xmlns:mc="http://schemas.openxmlformats.org/markup-compatibility/2006" xmlns:a14="http://schemas.microsoft.com/office/drawing/2010/main">
-        <mc:Choice Requires="a14">
+      <mc:AlternateContent xmlns:mc="http://schemas.openxmlformats.org/markup-compatibility/2006">
+        <mc:Choice xmlns:a14="http://schemas.microsoft.com/office/drawing/2010/main" Requires="a14">
           <p:sp>
             <p:nvSpPr>
               <p:cNvPr id="3" name="Content Placeholder 2">
@@ -8104,7 +8110,7 @@
             </p:txBody>
           </p:sp>
         </mc:Choice>
-        <mc:Fallback xmlns="">
+        <mc:Fallback>
           <p:sp>
             <p:nvSpPr>
               <p:cNvPr id="3" name="Content Placeholder 2">

</xml_diff>